<commit_message>
added label to seminar data
</commit_message>
<xml_diff>
--- a/5_seminar/Contents_Part_02/slides/slides_II_3.pptx
+++ b/5_seminar/Contents_Part_02/slides/slides_II_3.pptx
@@ -228,7 +228,7 @@
           <a:p>
             <a:fld id="{7A5B87F2-13FD-4A24-9F19-39B31C60B536}" type="datetimeFigureOut">
               <a:rPr lang="en-US" smtClean="0"/>
-              <a:t>4/28/2021</a:t>
+              <a:t>5/1/2021</a:t>
             </a:fld>
             <a:endParaRPr lang="en-US"/>
           </a:p>
@@ -2181,7 +2181,7 @@
           <a:p>
             <a:fld id="{5A1811BA-6AD9-41A7-B7A2-456C8523519C}" type="datetime1">
               <a:rPr lang="en-US" smtClean="0"/>
-              <a:t>4/28/2021</a:t>
+              <a:t>5/1/2021</a:t>
             </a:fld>
             <a:endParaRPr lang="en-US"/>
           </a:p>
@@ -2351,7 +2351,7 @@
           <a:p>
             <a:fld id="{B0494441-C196-4BB0-93EE-AF22360207AB}" type="datetime1">
               <a:rPr lang="en-US" smtClean="0"/>
-              <a:t>4/28/2021</a:t>
+              <a:t>5/1/2021</a:t>
             </a:fld>
             <a:endParaRPr lang="en-US"/>
           </a:p>
@@ -2531,7 +2531,7 @@
           <a:p>
             <a:fld id="{D7B9282B-C3CE-4F56-8DD1-5349F982F1D2}" type="datetime1">
               <a:rPr lang="en-US" smtClean="0"/>
-              <a:t>4/28/2021</a:t>
+              <a:t>5/1/2021</a:t>
             </a:fld>
             <a:endParaRPr lang="en-US"/>
           </a:p>
@@ -2701,7 +2701,7 @@
           <a:p>
             <a:fld id="{E6E86D6A-786F-4E85-AF3B-385015383ABA}" type="datetime1">
               <a:rPr lang="en-US" smtClean="0"/>
-              <a:t>4/28/2021</a:t>
+              <a:t>5/1/2021</a:t>
             </a:fld>
             <a:endParaRPr lang="en-US"/>
           </a:p>
@@ -2947,7 +2947,7 @@
           <a:p>
             <a:fld id="{051FFEB0-9C80-4A34-A5C7-72D52D52FC7D}" type="datetime1">
               <a:rPr lang="en-US" smtClean="0"/>
-              <a:t>4/28/2021</a:t>
+              <a:t>5/1/2021</a:t>
             </a:fld>
             <a:endParaRPr lang="en-US"/>
           </a:p>
@@ -3179,7 +3179,7 @@
           <a:p>
             <a:fld id="{084267AD-C299-471B-ABA1-D0EA94C7EDCF}" type="datetime1">
               <a:rPr lang="en-US" smtClean="0"/>
-              <a:t>4/28/2021</a:t>
+              <a:t>5/1/2021</a:t>
             </a:fld>
             <a:endParaRPr lang="en-US"/>
           </a:p>
@@ -3546,7 +3546,7 @@
           <a:p>
             <a:fld id="{6468DBC7-10F8-46A1-8CE1-DBB0A6F0EF3E}" type="datetime1">
               <a:rPr lang="en-US" smtClean="0"/>
-              <a:t>4/28/2021</a:t>
+              <a:t>5/1/2021</a:t>
             </a:fld>
             <a:endParaRPr lang="en-US"/>
           </a:p>
@@ -3664,7 +3664,7 @@
           <a:p>
             <a:fld id="{0A97ED80-8DDA-43A7-A78F-B0542D691D0E}" type="datetime1">
               <a:rPr lang="en-US" smtClean="0"/>
-              <a:t>4/28/2021</a:t>
+              <a:t>5/1/2021</a:t>
             </a:fld>
             <a:endParaRPr lang="en-US"/>
           </a:p>
@@ -3759,7 +3759,7 @@
           <a:p>
             <a:fld id="{0AF827E6-45BA-40D2-98F2-BE4FFF095577}" type="datetime1">
               <a:rPr lang="en-US" smtClean="0"/>
-              <a:t>4/28/2021</a:t>
+              <a:t>5/1/2021</a:t>
             </a:fld>
             <a:endParaRPr lang="en-US"/>
           </a:p>
@@ -4036,7 +4036,7 @@
           <a:p>
             <a:fld id="{42BD114C-22EA-4B1A-A45B-ED6465C7BB4E}" type="datetime1">
               <a:rPr lang="en-US" smtClean="0"/>
-              <a:t>4/28/2021</a:t>
+              <a:t>5/1/2021</a:t>
             </a:fld>
             <a:endParaRPr lang="en-US"/>
           </a:p>
@@ -4289,7 +4289,7 @@
           <a:p>
             <a:fld id="{F46F8903-38BE-4FD8-98FC-E4EF771B2D8C}" type="datetime1">
               <a:rPr lang="en-US" smtClean="0"/>
-              <a:t>4/28/2021</a:t>
+              <a:t>5/1/2021</a:t>
             </a:fld>
             <a:endParaRPr lang="en-US"/>
           </a:p>
@@ -4502,7 +4502,7 @@
           <a:p>
             <a:fld id="{A91AC8C7-9CA9-4E83-8CE3-AD3BE4150B39}" type="datetime1">
               <a:rPr lang="en-US" smtClean="0"/>
-              <a:t>4/28/2021</a:t>
+              <a:t>5/1/2021</a:t>
             </a:fld>
             <a:endParaRPr lang="en-US"/>
           </a:p>
@@ -7738,6 +7738,14 @@
             <a:r>
               <a:rPr lang="en-US"/>
               <a:t>Feature Collection  </a:t>
+            </a:r>
+            <a:r>
+              <a:rPr lang="en-US" b="1"/>
+              <a:t>Recall:</a:t>
+            </a:r>
+            <a:r>
+              <a:rPr lang="en-US"/>
+              <a:t> </a:t>
             </a:r>
             <a:r>
               <a:rPr lang="en-US" b="1"/>
@@ -11227,6 +11235,14 @@
             </a:r>
             <a:r>
               <a:rPr lang="en-US" b="1"/>
+              <a:t>Recall:</a:t>
+            </a:r>
+            <a:r>
+              <a:rPr lang="en-US"/>
+              <a:t> </a:t>
+            </a:r>
+            <a:r>
+              <a:rPr lang="en-US" b="1"/>
               <a:t>Task Structure</a:t>
             </a:r>
           </a:p>
@@ -16554,8 +16570,8 @@
           </a:p>
         </p:txBody>
       </p:sp>
-      <mc:AlternateContent xmlns:mc="http://schemas.openxmlformats.org/markup-compatibility/2006">
-        <mc:Choice xmlns:a14="http://schemas.microsoft.com/office/drawing/2010/main" Requires="a14">
+      <mc:AlternateContent xmlns:mc="http://schemas.openxmlformats.org/markup-compatibility/2006" xmlns:a14="http://schemas.microsoft.com/office/drawing/2010/main">
+        <mc:Choice Requires="a14">
           <p:sp>
             <p:nvSpPr>
               <p:cNvPr id="10" name="Content Placeholder 2">
@@ -16920,7 +16936,7 @@
             </p:txBody>
           </p:sp>
         </mc:Choice>
-        <mc:Fallback>
+        <mc:Fallback xmlns="">
           <p:sp>
             <p:nvSpPr>
               <p:cNvPr id="10" name="Content Placeholder 2">

</xml_diff>